<commit_message>
logo color updated, use MDL
</commit_message>
<xml_diff>
--- a/gfx/any2api-logo.pptx
+++ b/gfx/any2api-logo.pptx
@@ -208,7 +208,7 @@
           <a:p>
             <a:fld id="{562AF223-4E58-2C4F-BFBA-61F568579643}" type="datetimeFigureOut">
               <a:rPr lang="en-US" smtClean="0"/>
-              <a:t>11/18/16</a:t>
+              <a:t>1/29/17</a:t>
             </a:fld>
             <a:endParaRPr lang="en-US"/>
           </a:p>
@@ -657,7 +657,7 @@
           <a:p>
             <a:fld id="{7A7288C0-D835-184D-904D-DD7A53CAAC4A}" type="datetimeFigureOut">
               <a:rPr lang="en-US" smtClean="0"/>
-              <a:t>11/18/16</a:t>
+              <a:t>1/29/17</a:t>
             </a:fld>
             <a:endParaRPr lang="en-US"/>
           </a:p>
@@ -827,7 +827,7 @@
           <a:p>
             <a:fld id="{7A7288C0-D835-184D-904D-DD7A53CAAC4A}" type="datetimeFigureOut">
               <a:rPr lang="en-US" smtClean="0"/>
-              <a:t>11/18/16</a:t>
+              <a:t>1/29/17</a:t>
             </a:fld>
             <a:endParaRPr lang="en-US"/>
           </a:p>
@@ -1007,7 +1007,7 @@
           <a:p>
             <a:fld id="{7A7288C0-D835-184D-904D-DD7A53CAAC4A}" type="datetimeFigureOut">
               <a:rPr lang="en-US" smtClean="0"/>
-              <a:t>11/18/16</a:t>
+              <a:t>1/29/17</a:t>
             </a:fld>
             <a:endParaRPr lang="en-US"/>
           </a:p>
@@ -1177,7 +1177,7 @@
           <a:p>
             <a:fld id="{7A7288C0-D835-184D-904D-DD7A53CAAC4A}" type="datetimeFigureOut">
               <a:rPr lang="en-US" smtClean="0"/>
-              <a:t>11/18/16</a:t>
+              <a:t>1/29/17</a:t>
             </a:fld>
             <a:endParaRPr lang="en-US"/>
           </a:p>
@@ -1423,7 +1423,7 @@
           <a:p>
             <a:fld id="{7A7288C0-D835-184D-904D-DD7A53CAAC4A}" type="datetimeFigureOut">
               <a:rPr lang="en-US" smtClean="0"/>
-              <a:t>11/18/16</a:t>
+              <a:t>1/29/17</a:t>
             </a:fld>
             <a:endParaRPr lang="en-US"/>
           </a:p>
@@ -1711,7 +1711,7 @@
           <a:p>
             <a:fld id="{7A7288C0-D835-184D-904D-DD7A53CAAC4A}" type="datetimeFigureOut">
               <a:rPr lang="en-US" smtClean="0"/>
-              <a:t>11/18/16</a:t>
+              <a:t>1/29/17</a:t>
             </a:fld>
             <a:endParaRPr lang="en-US"/>
           </a:p>
@@ -2138,7 +2138,7 @@
           <a:p>
             <a:fld id="{7A7288C0-D835-184D-904D-DD7A53CAAC4A}" type="datetimeFigureOut">
               <a:rPr lang="en-US" smtClean="0"/>
-              <a:t>11/18/16</a:t>
+              <a:t>1/29/17</a:t>
             </a:fld>
             <a:endParaRPr lang="en-US"/>
           </a:p>
@@ -2256,7 +2256,7 @@
           <a:p>
             <a:fld id="{7A7288C0-D835-184D-904D-DD7A53CAAC4A}" type="datetimeFigureOut">
               <a:rPr lang="en-US" smtClean="0"/>
-              <a:t>11/18/16</a:t>
+              <a:t>1/29/17</a:t>
             </a:fld>
             <a:endParaRPr lang="en-US"/>
           </a:p>
@@ -2351,7 +2351,7 @@
           <a:p>
             <a:fld id="{7A7288C0-D835-184D-904D-DD7A53CAAC4A}" type="datetimeFigureOut">
               <a:rPr lang="en-US" smtClean="0"/>
-              <a:t>11/18/16</a:t>
+              <a:t>1/29/17</a:t>
             </a:fld>
             <a:endParaRPr lang="en-US"/>
           </a:p>
@@ -2628,7 +2628,7 @@
           <a:p>
             <a:fld id="{7A7288C0-D835-184D-904D-DD7A53CAAC4A}" type="datetimeFigureOut">
               <a:rPr lang="en-US" smtClean="0"/>
-              <a:t>11/18/16</a:t>
+              <a:t>1/29/17</a:t>
             </a:fld>
             <a:endParaRPr lang="en-US"/>
           </a:p>
@@ -2881,7 +2881,7 @@
           <a:p>
             <a:fld id="{7A7288C0-D835-184D-904D-DD7A53CAAC4A}" type="datetimeFigureOut">
               <a:rPr lang="en-US" smtClean="0"/>
-              <a:t>11/18/16</a:t>
+              <a:t>1/29/17</a:t>
             </a:fld>
             <a:endParaRPr lang="en-US"/>
           </a:p>
@@ -3099,7 +3099,7 @@
           <a:p>
             <a:fld id="{7A7288C0-D835-184D-904D-DD7A53CAAC4A}" type="datetimeFigureOut">
               <a:rPr lang="en-US" smtClean="0"/>
-              <a:t>11/18/16</a:t>
+              <a:t>1/29/17</a:t>
             </a:fld>
             <a:endParaRPr lang="en-US"/>
           </a:p>
@@ -3463,7 +3463,7 @@
     <p:bg>
       <p:bgPr>
         <a:solidFill>
-          <a:schemeClr val="tx2"/>
+          <a:srgbClr val="1A237E"/>
         </a:solidFill>
         <a:effectLst/>
       </p:bgPr>
@@ -3490,7 +3490,7 @@
         </p:nvSpPr>
         <p:spPr>
           <a:xfrm>
-            <a:off x="0" y="1346420"/>
+            <a:off x="0" y="1357709"/>
             <a:ext cx="7205663" cy="6555641"/>
           </a:xfrm>
           <a:prstGeom prst="rect">
@@ -3533,7 +3533,7 @@
         </p:nvSpPr>
         <p:spPr>
           <a:xfrm>
-            <a:off x="2376606" y="654537"/>
+            <a:off x="2366980" y="649724"/>
             <a:ext cx="2757167" cy="2756609"/>
           </a:xfrm>
           <a:prstGeom prst="ellipse">
@@ -3584,7 +3584,7 @@
         </p:nvSpPr>
         <p:spPr>
           <a:xfrm>
-            <a:off x="2923188" y="109478"/>
+            <a:off x="2913562" y="104665"/>
             <a:ext cx="1684131" cy="3708708"/>
           </a:xfrm>
           <a:prstGeom prst="rect">
@@ -3602,7 +3602,7 @@
             <a:r>
               <a:rPr lang="en-US" sz="23500" b="1" dirty="0" smtClean="0">
                 <a:solidFill>
-                  <a:schemeClr val="tx2"/>
+                  <a:srgbClr val="19237E"/>
                 </a:solidFill>
                 <a:latin typeface="Roboto Condensed Regular"/>
                 <a:cs typeface="Roboto Condensed Regular"/>
@@ -3611,7 +3611,7 @@
             </a:r>
             <a:endParaRPr lang="en-US" sz="23500" b="1" dirty="0">
               <a:solidFill>
-                <a:schemeClr val="tx2"/>
+                <a:srgbClr val="19237E"/>
               </a:solidFill>
               <a:latin typeface="Roboto Condensed Regular"/>
               <a:cs typeface="Roboto Condensed Regular"/>
@@ -3627,7 +3627,7 @@
         </p:nvSpPr>
         <p:spPr>
           <a:xfrm>
-            <a:off x="32507" y="-1124775"/>
+            <a:off x="22881" y="-1129588"/>
             <a:ext cx="3186539" cy="7325082"/>
           </a:xfrm>
           <a:prstGeom prst="rect">

</xml_diff>